<commit_message>
change title text to blue
</commit_message>
<xml_diff>
--- a/Presentations/Whiteboard_Wednesday_2018/WBW key.pptx
+++ b/Presentations/Whiteboard_Wednesday_2018/WBW key.pptx
@@ -1405,7 +1405,11 @@
         <a:lstStyle/>
         <a:p>
           <a:r>
-            <a:rPr lang="en-US" sz="3200" b="1" i="1" u="none" dirty="0"/>
+            <a:rPr lang="en-US" sz="3200" b="1" i="1" u="none" dirty="0">
+              <a:solidFill>
+                <a:srgbClr val="0070C0"/>
+              </a:solidFill>
+            </a:rPr>
             <a:t>Dichotomous Key for some of Concordia’s Trees</a:t>
           </a:r>
         </a:p>
@@ -2083,22 +2087,22 @@
     <dgm:cxn modelId="{091D8C3A-E9BA-418C-99D3-F73AB3A88EDA}" srcId="{551F2985-9B71-42D0-BAE1-6851015AB3F5}" destId="{0BE315B0-2A08-48A2-8976-CAB3281E0CC2}" srcOrd="0" destOrd="0" parTransId="{8A820D38-40FA-4464-9ACF-55290679B7A0}" sibTransId="{1C12D2AB-FD32-45EC-810F-58478BBEFDD8}"/>
     <dgm:cxn modelId="{FA74D73B-D73A-4BD3-842E-8AB48FAFCC01}" srcId="{8C4F1C33-8EF1-4FE2-B40F-740EE3519C6C}" destId="{04270EA3-25EC-4C15-ABA7-985498B151DE}" srcOrd="0" destOrd="0" parTransId="{67508673-C141-4AD3-AECC-34BEB6395F5E}" sibTransId="{1D5D65ED-4319-4A81-99C8-1AE906EAC019}"/>
     <dgm:cxn modelId="{2C793F3D-EAAD-472F-B986-3F23EFAC9CDB}" type="presOf" srcId="{6673BC15-1EB1-4F10-A27A-DE38421C2EC8}" destId="{0F51FF58-FC98-4FC1-ADBC-C215CAD3D1BF}" srcOrd="0" destOrd="0" presId="urn:microsoft.com/office/officeart/2005/8/layout/hierarchy1"/>
+    <dgm:cxn modelId="{4B185441-DC84-4834-8B53-34DC996C742E}" type="presOf" srcId="{67508673-C141-4AD3-AECC-34BEB6395F5E}" destId="{D63A3812-B6A8-4396-A40F-470F6DD8B84F}" srcOrd="0" destOrd="0" presId="urn:microsoft.com/office/officeart/2005/8/layout/hierarchy1"/>
+    <dgm:cxn modelId="{398B7A41-4B8F-4C0A-B916-3A2AD612995D}" srcId="{0F1EF227-D1B2-457E-9E18-4E5CC7B15FCE}" destId="{73CA3A15-D1E1-4083-9D9B-B9CE6DEAB081}" srcOrd="1" destOrd="0" parTransId="{9771D050-75B5-4503-9C92-08BD42BE7495}" sibTransId="{B870FED3-24CA-4CEB-AA9C-7AC13B568FC1}"/>
+    <dgm:cxn modelId="{4721A350-8006-47DB-A772-1D416B8823C9}" type="presOf" srcId="{AAF436A1-C859-4806-B2EE-8B381405B057}" destId="{2B575D70-0C69-4237-8E4C-D7348DFAD3AE}" srcOrd="0" destOrd="0" presId="urn:microsoft.com/office/officeart/2005/8/layout/hierarchy1"/>
+    <dgm:cxn modelId="{DC879B55-99D6-480F-AE00-48D5FDF696E7}" type="presOf" srcId="{9B022716-9CA8-4CA0-9FAB-3FF8F758F357}" destId="{9FB7D7D5-BF23-4618-8F66-4518422A3A30}" srcOrd="0" destOrd="0" presId="urn:microsoft.com/office/officeart/2005/8/layout/hierarchy1"/>
+    <dgm:cxn modelId="{2A6A9A56-1174-4F40-9721-F2E4D4A506F6}" srcId="{61F8E812-3737-486B-BEBC-98F567AAD8BD}" destId="{F6366962-9A28-4A2F-A648-FE1F16CC1133}" srcOrd="0" destOrd="0" parTransId="{D1E5E2F2-5814-4D83-A17C-78119ECEC120}" sibTransId="{86819825-C9EE-4614-B753-E63E5DEECE5D}"/>
+    <dgm:cxn modelId="{1978A556-F1F8-4FE4-8B11-AC287AA981EA}" type="presOf" srcId="{18BFA169-3639-4FAC-9F06-1A8B41D81482}" destId="{5EC54A97-65BA-4FC1-8D38-25413E068B7D}" srcOrd="0" destOrd="0" presId="urn:microsoft.com/office/officeart/2005/8/layout/hierarchy1"/>
+    <dgm:cxn modelId="{26217558-DAAB-4957-8BAA-C55F2E022650}" type="presOf" srcId="{259886E3-1317-44B3-8F02-F5F131190C8E}" destId="{CD05D4F0-3F68-4528-88DF-D4B0C7611230}" srcOrd="0" destOrd="0" presId="urn:microsoft.com/office/officeart/2005/8/layout/hierarchy1"/>
     <dgm:cxn modelId="{06C9215C-0DE5-46E7-A95D-289F6D2E956A}" type="presOf" srcId="{8A8E15A0-23BE-4134-A31C-25AEBB439D76}" destId="{8550FE59-E197-4B43-9DA1-B75FE6396D8C}" srcOrd="0" destOrd="0" presId="urn:microsoft.com/office/officeart/2005/8/layout/hierarchy1"/>
     <dgm:cxn modelId="{DECD995D-6E89-4879-A2EA-2EF727245C60}" type="presOf" srcId="{A9B23A1F-356A-4001-9A40-DC28DAC8B968}" destId="{EAC74BD8-7C85-40DC-9709-BCB325C57F15}" srcOrd="0" destOrd="0" presId="urn:microsoft.com/office/officeart/2005/8/layout/hierarchy1"/>
     <dgm:cxn modelId="{09719560-CC60-4AA2-B0B4-CFABEDEC87F6}" srcId="{0BE315B0-2A08-48A2-8976-CAB3281E0CC2}" destId="{0F1EF227-D1B2-457E-9E18-4E5CC7B15FCE}" srcOrd="0" destOrd="0" parTransId="{985E16B1-88E5-4271-B035-F48080789A0B}" sibTransId="{F868A94A-C75C-41F6-A653-7C39E464A2A1}"/>
-    <dgm:cxn modelId="{4B185441-DC84-4834-8B53-34DC996C742E}" type="presOf" srcId="{67508673-C141-4AD3-AECC-34BEB6395F5E}" destId="{D63A3812-B6A8-4396-A40F-470F6DD8B84F}" srcOrd="0" destOrd="0" presId="urn:microsoft.com/office/officeart/2005/8/layout/hierarchy1"/>
-    <dgm:cxn modelId="{398B7A41-4B8F-4C0A-B916-3A2AD612995D}" srcId="{0F1EF227-D1B2-457E-9E18-4E5CC7B15FCE}" destId="{73CA3A15-D1E1-4083-9D9B-B9CE6DEAB081}" srcOrd="1" destOrd="0" parTransId="{9771D050-75B5-4503-9C92-08BD42BE7495}" sibTransId="{B870FED3-24CA-4CEB-AA9C-7AC13B568FC1}"/>
     <dgm:cxn modelId="{CB098367-4892-4A25-887C-A75A313EF829}" type="presOf" srcId="{7EB935C1-9315-4F64-A126-400ED7A495E8}" destId="{D673C69E-BD6A-4FC4-ADF7-5D9668710ED2}" srcOrd="0" destOrd="0" presId="urn:microsoft.com/office/officeart/2005/8/layout/hierarchy1"/>
     <dgm:cxn modelId="{03F8B567-1FFD-45C1-AF67-AA6D533E5258}" type="presOf" srcId="{3F4F7D85-1711-4426-90E8-E419028A47D2}" destId="{10021EEF-2948-4D15-A4FE-2E98E65B6C74}" srcOrd="0" destOrd="0" presId="urn:microsoft.com/office/officeart/2005/8/layout/hierarchy1"/>
     <dgm:cxn modelId="{FFD21F70-E2F1-4BDD-8A54-06754EC4914E}" type="presOf" srcId="{DDF3FB3B-81AC-4C44-AA58-7EB2556198BE}" destId="{71B4AFA2-52FE-4AE0-A3E2-CE8986D4B307}" srcOrd="0" destOrd="0" presId="urn:microsoft.com/office/officeart/2005/8/layout/hierarchy1"/>
-    <dgm:cxn modelId="{4721A350-8006-47DB-A772-1D416B8823C9}" type="presOf" srcId="{AAF436A1-C859-4806-B2EE-8B381405B057}" destId="{2B575D70-0C69-4237-8E4C-D7348DFAD3AE}" srcOrd="0" destOrd="0" presId="urn:microsoft.com/office/officeart/2005/8/layout/hierarchy1"/>
     <dgm:cxn modelId="{3B0A4072-13C3-4CC2-A3B2-02A580296AFD}" type="presOf" srcId="{0F1EF227-D1B2-457E-9E18-4E5CC7B15FCE}" destId="{73C73387-0572-4EFF-B5B0-E64DD253C323}" srcOrd="0" destOrd="0" presId="urn:microsoft.com/office/officeart/2005/8/layout/hierarchy1"/>
-    <dgm:cxn modelId="{DC879B55-99D6-480F-AE00-48D5FDF696E7}" type="presOf" srcId="{9B022716-9CA8-4CA0-9FAB-3FF8F758F357}" destId="{9FB7D7D5-BF23-4618-8F66-4518422A3A30}" srcOrd="0" destOrd="0" presId="urn:microsoft.com/office/officeart/2005/8/layout/hierarchy1"/>
-    <dgm:cxn modelId="{2A6A9A56-1174-4F40-9721-F2E4D4A506F6}" srcId="{61F8E812-3737-486B-BEBC-98F567AAD8BD}" destId="{F6366962-9A28-4A2F-A648-FE1F16CC1133}" srcOrd="0" destOrd="0" parTransId="{D1E5E2F2-5814-4D83-A17C-78119ECEC120}" sibTransId="{86819825-C9EE-4614-B753-E63E5DEECE5D}"/>
-    <dgm:cxn modelId="{1978A556-F1F8-4FE4-8B11-AC287AA981EA}" type="presOf" srcId="{18BFA169-3639-4FAC-9F06-1A8B41D81482}" destId="{5EC54A97-65BA-4FC1-8D38-25413E068B7D}" srcOrd="0" destOrd="0" presId="urn:microsoft.com/office/officeart/2005/8/layout/hierarchy1"/>
     <dgm:cxn modelId="{99010A78-DBC3-478B-AA32-74176870B0B3}" type="presOf" srcId="{9771D050-75B5-4503-9C92-08BD42BE7495}" destId="{54472572-C60F-4350-81F8-8FF5574912EB}" srcOrd="0" destOrd="0" presId="urn:microsoft.com/office/officeart/2005/8/layout/hierarchy1"/>
     <dgm:cxn modelId="{E65A3E78-D504-4B20-B2A0-BF3D42E93AEB}" srcId="{6673BC15-1EB1-4F10-A27A-DE38421C2EC8}" destId="{34A77527-9B93-4713-8F90-DCDC7E7E9299}" srcOrd="0" destOrd="0" parTransId="{259886E3-1317-44B3-8F02-F5F131190C8E}" sibTransId="{08229F0D-B617-4651-81A4-3612FA917B7C}"/>
-    <dgm:cxn modelId="{26217558-DAAB-4957-8BAA-C55F2E022650}" type="presOf" srcId="{259886E3-1317-44B3-8F02-F5F131190C8E}" destId="{CD05D4F0-3F68-4528-88DF-D4B0C7611230}" srcOrd="0" destOrd="0" presId="urn:microsoft.com/office/officeart/2005/8/layout/hierarchy1"/>
     <dgm:cxn modelId="{5B7C117E-F359-468C-B46A-6F47C4B42955}" type="presOf" srcId="{9F9099F6-6FF1-4DFC-8E22-C174755F142A}" destId="{B2904312-4B51-486E-BA2A-D7976310A2E4}" srcOrd="0" destOrd="0" presId="urn:microsoft.com/office/officeart/2005/8/layout/hierarchy1"/>
     <dgm:cxn modelId="{294A1289-BB4C-4181-B924-87ECF8C5DE3D}" type="presOf" srcId="{D1E5E2F2-5814-4D83-A17C-78119ECEC120}" destId="{632169C4-B0AE-42CF-8E7F-3DBD17DD76C5}" srcOrd="0" destOrd="0" presId="urn:microsoft.com/office/officeart/2005/8/layout/hierarchy1"/>
     <dgm:cxn modelId="{00134799-4C05-4AF3-BF90-56C52982AF24}" type="presOf" srcId="{985E16B1-88E5-4271-B035-F48080789A0B}" destId="{D9D9CA6F-D837-4D3B-95EE-9F06DE0476B4}" srcOrd="0" destOrd="0" presId="urn:microsoft.com/office/officeart/2005/8/layout/hierarchy1"/>
@@ -3324,7 +3328,11 @@
             <a:buNone/>
           </a:pPr>
           <a:r>
-            <a:rPr lang="en-US" sz="3200" b="1" i="1" u="none" kern="1200" dirty="0"/>
+            <a:rPr lang="en-US" sz="3200" b="1" i="1" u="none" kern="1200" dirty="0">
+              <a:solidFill>
+                <a:srgbClr val="0070C0"/>
+              </a:solidFill>
+            </a:rPr>
             <a:t>Dichotomous Key for some of Concordia’s Trees</a:t>
           </a:r>
         </a:p>
@@ -7348,7 +7356,7 @@
           <a:p>
             <a:fld id="{43746A56-9E87-4D71-95A7-0AFFCA52BD66}" type="datetimeFigureOut">
               <a:rPr lang="en-US" smtClean="0"/>
-              <a:t>6/5/2018</a:t>
+              <a:t>8/13/18</a:t>
             </a:fld>
             <a:endParaRPr lang="en-US"/>
           </a:p>
@@ -7546,7 +7554,7 @@
           <a:p>
             <a:fld id="{43746A56-9E87-4D71-95A7-0AFFCA52BD66}" type="datetimeFigureOut">
               <a:rPr lang="en-US" smtClean="0"/>
-              <a:t>6/5/2018</a:t>
+              <a:t>8/13/18</a:t>
             </a:fld>
             <a:endParaRPr lang="en-US"/>
           </a:p>
@@ -7754,7 +7762,7 @@
           <a:p>
             <a:fld id="{43746A56-9E87-4D71-95A7-0AFFCA52BD66}" type="datetimeFigureOut">
               <a:rPr lang="en-US" smtClean="0"/>
-              <a:t>6/5/2018</a:t>
+              <a:t>8/13/18</a:t>
             </a:fld>
             <a:endParaRPr lang="en-US"/>
           </a:p>
@@ -7952,7 +7960,7 @@
           <a:p>
             <a:fld id="{43746A56-9E87-4D71-95A7-0AFFCA52BD66}" type="datetimeFigureOut">
               <a:rPr lang="en-US" smtClean="0"/>
-              <a:t>6/5/2018</a:t>
+              <a:t>8/13/18</a:t>
             </a:fld>
             <a:endParaRPr lang="en-US"/>
           </a:p>
@@ -8227,7 +8235,7 @@
           <a:p>
             <a:fld id="{43746A56-9E87-4D71-95A7-0AFFCA52BD66}" type="datetimeFigureOut">
               <a:rPr lang="en-US" smtClean="0"/>
-              <a:t>6/5/2018</a:t>
+              <a:t>8/13/18</a:t>
             </a:fld>
             <a:endParaRPr lang="en-US"/>
           </a:p>
@@ -8492,7 +8500,7 @@
           <a:p>
             <a:fld id="{43746A56-9E87-4D71-95A7-0AFFCA52BD66}" type="datetimeFigureOut">
               <a:rPr lang="en-US" smtClean="0"/>
-              <a:t>6/5/2018</a:t>
+              <a:t>8/13/18</a:t>
             </a:fld>
             <a:endParaRPr lang="en-US"/>
           </a:p>
@@ -8904,7 +8912,7 @@
           <a:p>
             <a:fld id="{43746A56-9E87-4D71-95A7-0AFFCA52BD66}" type="datetimeFigureOut">
               <a:rPr lang="en-US" smtClean="0"/>
-              <a:t>6/5/2018</a:t>
+              <a:t>8/13/18</a:t>
             </a:fld>
             <a:endParaRPr lang="en-US"/>
           </a:p>
@@ -9045,7 +9053,7 @@
           <a:p>
             <a:fld id="{43746A56-9E87-4D71-95A7-0AFFCA52BD66}" type="datetimeFigureOut">
               <a:rPr lang="en-US" smtClean="0"/>
-              <a:t>6/5/2018</a:t>
+              <a:t>8/13/18</a:t>
             </a:fld>
             <a:endParaRPr lang="en-US"/>
           </a:p>
@@ -9158,7 +9166,7 @@
           <a:p>
             <a:fld id="{43746A56-9E87-4D71-95A7-0AFFCA52BD66}" type="datetimeFigureOut">
               <a:rPr lang="en-US" smtClean="0"/>
-              <a:t>6/5/2018</a:t>
+              <a:t>8/13/18</a:t>
             </a:fld>
             <a:endParaRPr lang="en-US"/>
           </a:p>
@@ -9469,7 +9477,7 @@
           <a:p>
             <a:fld id="{43746A56-9E87-4D71-95A7-0AFFCA52BD66}" type="datetimeFigureOut">
               <a:rPr lang="en-US" smtClean="0"/>
-              <a:t>6/5/2018</a:t>
+              <a:t>8/13/18</a:t>
             </a:fld>
             <a:endParaRPr lang="en-US"/>
           </a:p>
@@ -9757,7 +9765,7 @@
           <a:p>
             <a:fld id="{43746A56-9E87-4D71-95A7-0AFFCA52BD66}" type="datetimeFigureOut">
               <a:rPr lang="en-US" smtClean="0"/>
-              <a:t>6/5/2018</a:t>
+              <a:t>8/13/18</a:t>
             </a:fld>
             <a:endParaRPr lang="en-US"/>
           </a:p>
@@ -9998,7 +10006,7 @@
           <a:p>
             <a:fld id="{43746A56-9E87-4D71-95A7-0AFFCA52BD66}" type="datetimeFigureOut">
               <a:rPr lang="en-US" smtClean="0"/>
-              <a:t>6/5/2018</a:t>
+              <a:t>8/13/18</a:t>
             </a:fld>
             <a:endParaRPr lang="en-US"/>
           </a:p>
@@ -10428,7 +10436,7 @@
           <p:nvPr>
             <p:extLst>
               <p:ext uri="{D42A27DB-BD31-4B8C-83A1-F6EECF244321}">
-                <p14:modId xmlns:p14="http://schemas.microsoft.com/office/powerpoint/2010/main" val="3746877670"/>
+                <p14:modId xmlns:p14="http://schemas.microsoft.com/office/powerpoint/2010/main" val="3846634311"/>
               </p:ext>
             </p:extLst>
           </p:nvPr>

</xml_diff>